<commit_message>
Fix segmentation fault in Memory/CPU Test - Use saved_config->command instead of original config->command
</commit_message>
<xml_diff>
--- a/mini_container_presentation.pptx
+++ b/mini_container_presentation.pptx
@@ -9,7 +9,9 @@
     <p:sldId id="257" r:id="rId3"/>
     <p:sldId id="258" r:id="rId4"/>
     <p:sldId id="259" r:id="rId5"/>
-    <p:sldId id="260" r:id="rId6"/>
+    <p:sldId id="262" r:id="rId6"/>
+    <p:sldId id="261" r:id="rId7"/>
+    <p:sldId id="260" r:id="rId8"/>
   </p:sldIdLst>
   <p:sldSz cx="9144000" cy="6858000" type="screen4x3"/>
   <p:notesSz cx="6858000" cy="9144000"/>
@@ -1028,7 +1030,7 @@
           <a:p>
             <a:fld id="{5BCAD085-E8A6-8845-BD4E-CB4CCA059FC4}" type="datetimeFigureOut">
               <a:rPr lang="en-US" smtClean="0"/>
-              <a:t>1/23/2026</a:t>
+              <a:t>2/1/2026</a:t>
             </a:fld>
             <a:endParaRPr lang="en-US"/>
           </a:p>
@@ -1196,7 +1198,7 @@
           <a:p>
             <a:fld id="{5BCAD085-E8A6-8845-BD4E-CB4CCA059FC4}" type="datetimeFigureOut">
               <a:rPr lang="en-US" smtClean="0"/>
-              <a:t>1/23/2026</a:t>
+              <a:t>2/1/2026</a:t>
             </a:fld>
             <a:endParaRPr lang="en-US"/>
           </a:p>
@@ -1374,7 +1376,7 @@
           <a:p>
             <a:fld id="{5BCAD085-E8A6-8845-BD4E-CB4CCA059FC4}" type="datetimeFigureOut">
               <a:rPr lang="en-US" smtClean="0"/>
-              <a:t>1/23/2026</a:t>
+              <a:t>2/1/2026</a:t>
             </a:fld>
             <a:endParaRPr lang="en-US"/>
           </a:p>
@@ -1542,7 +1544,7 @@
           <a:p>
             <a:fld id="{5BCAD085-E8A6-8845-BD4E-CB4CCA059FC4}" type="datetimeFigureOut">
               <a:rPr lang="en-US" smtClean="0"/>
-              <a:t>1/23/2026</a:t>
+              <a:t>2/1/2026</a:t>
             </a:fld>
             <a:endParaRPr lang="en-US"/>
           </a:p>
@@ -1787,7 +1789,7 @@
           <a:p>
             <a:fld id="{5BCAD085-E8A6-8845-BD4E-CB4CCA059FC4}" type="datetimeFigureOut">
               <a:rPr lang="en-US" smtClean="0"/>
-              <a:t>1/23/2026</a:t>
+              <a:t>2/1/2026</a:t>
             </a:fld>
             <a:endParaRPr lang="en-US"/>
           </a:p>
@@ -2072,7 +2074,7 @@
           <a:p>
             <a:fld id="{5BCAD085-E8A6-8845-BD4E-CB4CCA059FC4}" type="datetimeFigureOut">
               <a:rPr lang="en-US" smtClean="0"/>
-              <a:t>1/23/2026</a:t>
+              <a:t>2/1/2026</a:t>
             </a:fld>
             <a:endParaRPr lang="en-US"/>
           </a:p>
@@ -2491,7 +2493,7 @@
           <a:p>
             <a:fld id="{5BCAD085-E8A6-8845-BD4E-CB4CCA059FC4}" type="datetimeFigureOut">
               <a:rPr lang="en-US" smtClean="0"/>
-              <a:t>1/23/2026</a:t>
+              <a:t>2/1/2026</a:t>
             </a:fld>
             <a:endParaRPr lang="en-US"/>
           </a:p>
@@ -2608,7 +2610,7 @@
           <a:p>
             <a:fld id="{5BCAD085-E8A6-8845-BD4E-CB4CCA059FC4}" type="datetimeFigureOut">
               <a:rPr lang="en-US" smtClean="0"/>
-              <a:t>1/23/2026</a:t>
+              <a:t>2/1/2026</a:t>
             </a:fld>
             <a:endParaRPr lang="en-US"/>
           </a:p>
@@ -2703,7 +2705,7 @@
           <a:p>
             <a:fld id="{5BCAD085-E8A6-8845-BD4E-CB4CCA059FC4}" type="datetimeFigureOut">
               <a:rPr lang="en-US" smtClean="0"/>
-              <a:t>1/23/2026</a:t>
+              <a:t>2/1/2026</a:t>
             </a:fld>
             <a:endParaRPr lang="en-US"/>
           </a:p>
@@ -2978,7 +2980,7 @@
           <a:p>
             <a:fld id="{5BCAD085-E8A6-8845-BD4E-CB4CCA059FC4}" type="datetimeFigureOut">
               <a:rPr lang="en-US" smtClean="0"/>
-              <a:t>1/23/2026</a:t>
+              <a:t>2/1/2026</a:t>
             </a:fld>
             <a:endParaRPr lang="en-US"/>
           </a:p>
@@ -3230,7 +3232,7 @@
           <a:p>
             <a:fld id="{5BCAD085-E8A6-8845-BD4E-CB4CCA059FC4}" type="datetimeFigureOut">
               <a:rPr lang="en-US" smtClean="0"/>
-              <a:t>1/23/2026</a:t>
+              <a:t>2/1/2026</a:t>
             </a:fld>
             <a:endParaRPr lang="en-US"/>
           </a:p>
@@ -3441,7 +3443,7 @@
           <a:p>
             <a:fld id="{5BCAD085-E8A6-8845-BD4E-CB4CCA059FC4}" type="datetimeFigureOut">
               <a:rPr lang="en-US" smtClean="0"/>
-              <a:t>1/23/2026</a:t>
+              <a:t>2/1/2026</a:t>
             </a:fld>
             <a:endParaRPr lang="en-US"/>
           </a:p>
@@ -4623,143 +4625,39 @@
           <a:bodyPr/>
           <a:lstStyle/>
           <a:p>
-            <a:r>
-              <a:rPr lang="en-US" dirty="0"/>
-              <a:t>Container manager - State Base</a:t>
-            </a:r>
-          </a:p>
-        </p:txBody>
-      </p:sp>
-      <p:sp>
-        <p:nvSpPr>
-          <p:cNvPr id="3" name="Content Placeholder 2">
+            <a:endParaRPr lang="en-US" dirty="0"/>
+          </a:p>
+        </p:txBody>
+      </p:sp>
+      <p:pic>
+        <p:nvPicPr>
+          <p:cNvPr id="5" name="Content Placeholder 4" descr="A diagram of a running process&#10;&#10;AI-generated content may be incorrect.">
             <a:extLst>
               <a:ext uri="{FF2B5EF4-FFF2-40B4-BE49-F238E27FC236}">
-                <a16:creationId xmlns:a16="http://schemas.microsoft.com/office/drawing/2014/main" id="{3ECE378A-AC8D-16EE-B632-DBF2D34B516F}"/>
+                <a16:creationId xmlns:a16="http://schemas.microsoft.com/office/drawing/2014/main" id="{88CCB23A-32BB-C1EF-940B-5641B91C406F}"/>
               </a:ext>
             </a:extLst>
           </p:cNvPr>
-          <p:cNvSpPr>
-            <a:spLocks noGrp="1"/>
-          </p:cNvSpPr>
+          <p:cNvPicPr>
+            <a:picLocks noGrp="1" noChangeAspect="1"/>
+          </p:cNvPicPr>
           <p:nvPr>
             <p:ph idx="1"/>
           </p:nvPr>
-        </p:nvSpPr>
+        </p:nvPicPr>
+        <p:blipFill>
+          <a:blip r:embed="rId2"/>
+          <a:stretch>
+            <a:fillRect/>
+          </a:stretch>
+        </p:blipFill>
         <p:spPr>
           <a:xfrm>
-            <a:off x="0" y="1603094"/>
-            <a:ext cx="8229600" cy="4525963"/>
+            <a:off x="58262" y="1595256"/>
+            <a:ext cx="9027476" cy="4924078"/>
           </a:xfrm>
         </p:spPr>
-        <p:txBody>
-          <a:bodyPr/>
-          <a:lstStyle/>
-          <a:p>
-            <a:pPr marL="0" indent="0">
-              <a:buNone/>
-            </a:pPr>
-            <a:r>
-              <a:rPr lang="en-US" b="0" dirty="0">
-                <a:solidFill>
-                  <a:srgbClr val="0070C0"/>
-                </a:solidFill>
-                <a:effectLst/>
-                <a:latin typeface="Consolas" panose="020B0609020204030204" pitchFamily="49" charset="0"/>
-              </a:rPr>
-              <a:t>    CREATED</a:t>
-            </a:r>
-          </a:p>
-          <a:p>
-            <a:pPr marL="0" indent="0">
-              <a:buNone/>
-            </a:pPr>
-            <a:endParaRPr lang="en-US" b="0" dirty="0">
-              <a:solidFill>
-                <a:srgbClr val="0070C0"/>
-              </a:solidFill>
-              <a:effectLst/>
-              <a:latin typeface="Consolas" panose="020B0609020204030204" pitchFamily="49" charset="0"/>
-            </a:endParaRPr>
-          </a:p>
-          <a:p>
-            <a:pPr marL="0" indent="0">
-              <a:buNone/>
-            </a:pPr>
-            <a:r>
-              <a:rPr lang="en-US" b="0" dirty="0">
-                <a:solidFill>
-                  <a:srgbClr val="0070C0"/>
-                </a:solidFill>
-                <a:effectLst/>
-                <a:latin typeface="Consolas" panose="020B0609020204030204" pitchFamily="49" charset="0"/>
-              </a:rPr>
-              <a:t>    RUNNING</a:t>
-            </a:r>
-          </a:p>
-          <a:p>
-            <a:pPr marL="0" indent="0">
-              <a:buNone/>
-            </a:pPr>
-            <a:endParaRPr lang="en-US" b="0" dirty="0">
-              <a:solidFill>
-                <a:srgbClr val="0070C0"/>
-              </a:solidFill>
-              <a:effectLst/>
-              <a:latin typeface="Consolas" panose="020B0609020204030204" pitchFamily="49" charset="0"/>
-            </a:endParaRPr>
-          </a:p>
-          <a:p>
-            <a:pPr marL="0" indent="0">
-              <a:buNone/>
-            </a:pPr>
-            <a:r>
-              <a:rPr lang="en-US" b="0" dirty="0">
-                <a:solidFill>
-                  <a:srgbClr val="0070C0"/>
-                </a:solidFill>
-                <a:effectLst/>
-                <a:latin typeface="Consolas" panose="020B0609020204030204" pitchFamily="49" charset="0"/>
-              </a:rPr>
-              <a:t>    STOPPED</a:t>
-            </a:r>
-          </a:p>
-          <a:p>
-            <a:pPr marL="0" indent="0">
-              <a:buNone/>
-            </a:pPr>
-            <a:endParaRPr lang="en-US" b="0" dirty="0">
-              <a:solidFill>
-                <a:srgbClr val="0070C0"/>
-              </a:solidFill>
-              <a:effectLst/>
-              <a:latin typeface="Consolas" panose="020B0609020204030204" pitchFamily="49" charset="0"/>
-            </a:endParaRPr>
-          </a:p>
-          <a:p>
-            <a:pPr marL="0" indent="0">
-              <a:buNone/>
-            </a:pPr>
-            <a:r>
-              <a:rPr lang="en-US" b="0" dirty="0">
-                <a:solidFill>
-                  <a:srgbClr val="0070C0"/>
-                </a:solidFill>
-                <a:effectLst/>
-                <a:latin typeface="Consolas" panose="020B0609020204030204" pitchFamily="49" charset="0"/>
-              </a:rPr>
-              <a:t>    DESTROYED</a:t>
-            </a:r>
-          </a:p>
-          <a:p>
-            <a:endParaRPr lang="en-US" dirty="0">
-              <a:solidFill>
-                <a:srgbClr val="0070C0"/>
-              </a:solidFill>
-            </a:endParaRPr>
-          </a:p>
-        </p:txBody>
-      </p:sp>
+      </p:pic>
     </p:spTree>
     <p:extLst>
       <p:ext uri="{BB962C8B-B14F-4D97-AF65-F5344CB8AC3E}">
@@ -4774,6 +4672,1000 @@
 </file>
 
 <file path=ppt/slides/slide5.xml><?xml version="1.0" encoding="utf-8"?>
+<p:sld xmlns:a="http://schemas.openxmlformats.org/drawingml/2006/main" xmlns:r="http://schemas.openxmlformats.org/officeDocument/2006/relationships" xmlns:p="http://schemas.openxmlformats.org/presentationml/2006/main">
+  <p:cSld>
+    <p:spTree>
+      <p:nvGrpSpPr>
+        <p:cNvPr id="1" name=""/>
+        <p:cNvGrpSpPr/>
+        <p:nvPr/>
+      </p:nvGrpSpPr>
+      <p:grpSpPr>
+        <a:xfrm>
+          <a:off x="0" y="0"/>
+          <a:ext cx="0" cy="0"/>
+          <a:chOff x="0" y="0"/>
+          <a:chExt cx="0" cy="0"/>
+        </a:xfrm>
+      </p:grpSpPr>
+      <p:sp>
+        <p:nvSpPr>
+          <p:cNvPr id="2" name="Title 1">
+            <a:extLst>
+              <a:ext uri="{FF2B5EF4-FFF2-40B4-BE49-F238E27FC236}">
+                <a16:creationId xmlns:a16="http://schemas.microsoft.com/office/drawing/2014/main" id="{E3C25567-1CDE-522F-78F7-4CAE58A7AD13}"/>
+              </a:ext>
+            </a:extLst>
+          </p:cNvPr>
+          <p:cNvSpPr>
+            <a:spLocks noGrp="1"/>
+          </p:cNvSpPr>
+          <p:nvPr>
+            <p:ph type="title"/>
+          </p:nvPr>
+        </p:nvSpPr>
+        <p:spPr>
+          <a:xfrm>
+            <a:off x="770467" y="228601"/>
+            <a:ext cx="8229600" cy="6383866"/>
+          </a:xfrm>
+        </p:spPr>
+        <p:txBody>
+          <a:bodyPr>
+            <a:noAutofit/>
+          </a:bodyPr>
+          <a:lstStyle/>
+          <a:p>
+            <a:pPr algn="r" defTabSz="914400" rtl="1" eaLnBrk="0" fontAlgn="base" hangingPunct="0">
+              <a:spcAft>
+                <a:spcPct val="0"/>
+              </a:spcAft>
+            </a:pPr>
+            <a:r>
+              <a:rPr kumimoji="0" lang="ar-SA" altLang="en-US" sz="2000" b="1" i="0" u="sng" strike="noStrike" cap="none" normalizeH="0" baseline="0" dirty="0">
+                <a:ln>
+                  <a:noFill/>
+                </a:ln>
+                <a:solidFill>
+                  <a:schemeClr val="tx1"/>
+                </a:solidFill>
+                <a:effectLst/>
+                <a:latin typeface="Dana Light" pitchFamily="2" charset="-78"/>
+                <a:cs typeface="Dana Light" pitchFamily="2" charset="-78"/>
+              </a:rPr>
+              <a:t>هدف کلی این ماژول</a:t>
+            </a:r>
+            <a:r>
+              <a:rPr kumimoji="0" lang="fa-IR" altLang="en-US" sz="2000" b="1" i="0" u="sng" strike="noStrike" cap="none" normalizeH="0" baseline="0" dirty="0">
+                <a:ln>
+                  <a:noFill/>
+                </a:ln>
+                <a:solidFill>
+                  <a:schemeClr val="tx1"/>
+                </a:solidFill>
+                <a:effectLst/>
+                <a:latin typeface="Dana Light" pitchFamily="2" charset="-78"/>
+                <a:cs typeface="Dana Light" pitchFamily="2" charset="-78"/>
+              </a:rPr>
+              <a:t> </a:t>
+            </a:r>
+            <a:r>
+              <a:rPr kumimoji="0" lang="en-US" altLang="en-US" sz="2000" b="1" i="0" u="sng" strike="noStrike" cap="none" normalizeH="0" baseline="0" dirty="0">
+                <a:ln>
+                  <a:noFill/>
+                </a:ln>
+                <a:solidFill>
+                  <a:schemeClr val="tx1"/>
+                </a:solidFill>
+                <a:effectLst/>
+                <a:latin typeface="Dana Light" pitchFamily="2" charset="-78"/>
+                <a:cs typeface="Dana Light" pitchFamily="2" charset="-78"/>
+              </a:rPr>
+              <a:t>file-system</a:t>
+            </a:r>
+            <a:br>
+              <a:rPr kumimoji="0" lang="en-US" altLang="en-US" sz="2000" b="1" i="0" u="sng" strike="noStrike" cap="none" normalizeH="0" baseline="0" dirty="0">
+                <a:ln>
+                  <a:noFill/>
+                </a:ln>
+                <a:solidFill>
+                  <a:schemeClr val="tx1"/>
+                </a:solidFill>
+                <a:effectLst/>
+                <a:latin typeface="Dana Light" pitchFamily="2" charset="-78"/>
+                <a:cs typeface="Dana Light" pitchFamily="2" charset="-78"/>
+              </a:rPr>
+            </a:br>
+            <a:br>
+              <a:rPr kumimoji="0" lang="ar-SA" altLang="en-US" sz="2000" b="1" i="0" u="sng" strike="noStrike" cap="none" normalizeH="0" baseline="0" dirty="0">
+                <a:ln>
+                  <a:noFill/>
+                </a:ln>
+                <a:solidFill>
+                  <a:schemeClr val="tx1"/>
+                </a:solidFill>
+                <a:effectLst/>
+                <a:latin typeface="Dana Light" pitchFamily="2" charset="-78"/>
+                <a:cs typeface="Dana Light" pitchFamily="2" charset="-78"/>
+              </a:rPr>
+            </a:br>
+            <a:r>
+              <a:rPr lang="fa-IR" altLang="en-US" sz="2000" dirty="0">
+                <a:latin typeface="Dana Light" pitchFamily="2" charset="-78"/>
+                <a:cs typeface="Dana Light" pitchFamily="2" charset="-78"/>
+              </a:rPr>
+              <a:t>- </a:t>
+            </a:r>
+            <a:r>
+              <a:rPr kumimoji="0" lang="ar-SA" altLang="en-US" sz="2000" i="0" u="none" strike="noStrike" cap="none" normalizeH="0" baseline="0" dirty="0">
+                <a:ln>
+                  <a:noFill/>
+                </a:ln>
+                <a:solidFill>
+                  <a:schemeClr val="tx1"/>
+                </a:solidFill>
+                <a:effectLst/>
+                <a:latin typeface="Dana Light" pitchFamily="2" charset="-78"/>
+                <a:cs typeface="Dana Light" pitchFamily="2" charset="-78"/>
+              </a:rPr>
+              <a:t>یک </a:t>
+            </a:r>
+            <a:r>
+              <a:rPr kumimoji="0" lang="en-US" altLang="en-US" sz="2000" i="0" u="none" strike="noStrike" cap="none" normalizeH="0" baseline="0" dirty="0">
+                <a:ln>
+                  <a:noFill/>
+                </a:ln>
+                <a:solidFill>
+                  <a:schemeClr val="tx1"/>
+                </a:solidFill>
+                <a:effectLst/>
+                <a:latin typeface="Dana Light" pitchFamily="2" charset="-78"/>
+                <a:cs typeface="Dana Light" pitchFamily="2" charset="-78"/>
+              </a:rPr>
+              <a:t>root filesystem </a:t>
+            </a:r>
+            <a:r>
+              <a:rPr kumimoji="0" lang="ar-SA" altLang="en-US" sz="2000" i="0" u="none" strike="noStrike" cap="none" normalizeH="0" baseline="0" dirty="0">
+                <a:ln>
+                  <a:noFill/>
+                </a:ln>
+                <a:solidFill>
+                  <a:schemeClr val="tx1"/>
+                </a:solidFill>
+                <a:effectLst/>
+                <a:latin typeface="Dana Light" pitchFamily="2" charset="-78"/>
+                <a:cs typeface="Dana Light" pitchFamily="2" charset="-78"/>
+              </a:rPr>
+              <a:t>مینیمال بسازد</a:t>
+            </a:r>
+            <a:br>
+              <a:rPr kumimoji="0" lang="ar-SA" altLang="en-US" sz="2000" i="0" u="none" strike="noStrike" cap="none" normalizeH="0" baseline="0" dirty="0">
+                <a:ln>
+                  <a:noFill/>
+                </a:ln>
+                <a:solidFill>
+                  <a:schemeClr val="tx1"/>
+                </a:solidFill>
+                <a:effectLst/>
+                <a:latin typeface="Dana Light" pitchFamily="2" charset="-78"/>
+                <a:cs typeface="Dana Light" pitchFamily="2" charset="-78"/>
+              </a:rPr>
+            </a:br>
+            <a:r>
+              <a:rPr kumimoji="0" lang="fa-IR" altLang="en-US" sz="2000" i="0" u="none" strike="noStrike" cap="none" normalizeH="0" baseline="0" dirty="0">
+                <a:ln>
+                  <a:noFill/>
+                </a:ln>
+                <a:solidFill>
+                  <a:schemeClr val="tx1"/>
+                </a:solidFill>
+                <a:effectLst/>
+                <a:latin typeface="Dana Light" pitchFamily="2" charset="-78"/>
+                <a:cs typeface="Dana Light" pitchFamily="2" charset="-78"/>
+              </a:rPr>
+              <a:t>- </a:t>
+            </a:r>
+            <a:r>
+              <a:rPr kumimoji="0" lang="ar-SA" altLang="en-US" sz="2000" i="0" u="none" strike="noStrike" cap="none" normalizeH="0" baseline="0" dirty="0">
+                <a:ln>
+                  <a:noFill/>
+                </a:ln>
+                <a:solidFill>
+                  <a:schemeClr val="tx1"/>
+                </a:solidFill>
+                <a:effectLst/>
+                <a:latin typeface="Dana Light" pitchFamily="2" charset="-78"/>
+                <a:cs typeface="Dana Light" pitchFamily="2" charset="-78"/>
+              </a:rPr>
+              <a:t>دایرکتوری‌ها و </a:t>
+            </a:r>
+            <a:r>
+              <a:rPr kumimoji="0" lang="en-US" altLang="en-US" sz="2000" i="0" u="none" strike="noStrike" cap="none" normalizeH="0" baseline="0" dirty="0">
+                <a:ln>
+                  <a:noFill/>
+                </a:ln>
+                <a:solidFill>
+                  <a:schemeClr val="tx1"/>
+                </a:solidFill>
+                <a:effectLst/>
+                <a:latin typeface="Dana Light" pitchFamily="2" charset="-78"/>
+                <a:cs typeface="Dana Light" pitchFamily="2" charset="-78"/>
+              </a:rPr>
+              <a:t>device file</a:t>
+            </a:r>
+            <a:r>
+              <a:rPr kumimoji="0" lang="ar-SA" altLang="en-US" sz="2000" i="0" u="none" strike="noStrike" cap="none" normalizeH="0" baseline="0" dirty="0">
+                <a:ln>
+                  <a:noFill/>
+                </a:ln>
+                <a:solidFill>
+                  <a:schemeClr val="tx1"/>
+                </a:solidFill>
+                <a:effectLst/>
+                <a:latin typeface="Dana Light" pitchFamily="2" charset="-78"/>
+                <a:cs typeface="Dana Light" pitchFamily="2" charset="-78"/>
+              </a:rPr>
+              <a:t>های ضروری را ایجاد کند</a:t>
+            </a:r>
+            <a:br>
+              <a:rPr kumimoji="0" lang="ar-SA" altLang="en-US" sz="2000" i="0" u="none" strike="noStrike" cap="none" normalizeH="0" baseline="0" dirty="0">
+                <a:ln>
+                  <a:noFill/>
+                </a:ln>
+                <a:solidFill>
+                  <a:schemeClr val="tx1"/>
+                </a:solidFill>
+                <a:effectLst/>
+                <a:latin typeface="Dana Light" pitchFamily="2" charset="-78"/>
+                <a:cs typeface="Dana Light" pitchFamily="2" charset="-78"/>
+              </a:rPr>
+            </a:br>
+            <a:r>
+              <a:rPr kumimoji="0" lang="fa-IR" altLang="en-US" sz="2000" i="0" u="none" strike="noStrike" cap="none" normalizeH="0" baseline="0" dirty="0">
+                <a:ln>
+                  <a:noFill/>
+                </a:ln>
+                <a:solidFill>
+                  <a:schemeClr val="tx1"/>
+                </a:solidFill>
+                <a:effectLst/>
+                <a:latin typeface="Dana Light" pitchFamily="2" charset="-78"/>
+                <a:cs typeface="Dana Light" pitchFamily="2" charset="-78"/>
+              </a:rPr>
+              <a:t>- </a:t>
+            </a:r>
+            <a:r>
+              <a:rPr kumimoji="0" lang="ar-SA" altLang="en-US" sz="2000" i="0" u="none" strike="noStrike" cap="none" normalizeH="0" baseline="0" dirty="0">
+                <a:ln>
+                  <a:noFill/>
+                </a:ln>
+                <a:solidFill>
+                  <a:schemeClr val="tx1"/>
+                </a:solidFill>
+                <a:effectLst/>
+                <a:latin typeface="Dana Light" pitchFamily="2" charset="-78"/>
+                <a:cs typeface="Dana Light" pitchFamily="2" charset="-78"/>
+              </a:rPr>
+              <a:t>فایل‌های حیاتی </a:t>
+            </a:r>
+            <a:r>
+              <a:rPr kumimoji="0" lang="fa-IR" altLang="en-US" sz="2000" i="0" u="none" strike="noStrike" cap="none" normalizeH="0" baseline="0" dirty="0">
+                <a:ln>
+                  <a:noFill/>
+                </a:ln>
+                <a:solidFill>
+                  <a:schemeClr val="tx1"/>
+                </a:solidFill>
+                <a:effectLst/>
+                <a:latin typeface="Dana Light" pitchFamily="2" charset="-78"/>
+                <a:cs typeface="Dana Light" pitchFamily="2" charset="-78"/>
+              </a:rPr>
+              <a:t>(</a:t>
+            </a:r>
+            <a:r>
+              <a:rPr kumimoji="0" lang="en-US" altLang="en-US" sz="2000" i="0" u="none" strike="noStrike" cap="none" normalizeH="0" baseline="0" dirty="0" err="1">
+                <a:ln>
+                  <a:noFill/>
+                </a:ln>
+                <a:solidFill>
+                  <a:schemeClr val="tx1"/>
+                </a:solidFill>
+                <a:effectLst/>
+                <a:latin typeface="Dana Light" pitchFamily="2" charset="-78"/>
+                <a:cs typeface="Dana Light" pitchFamily="2" charset="-78"/>
+              </a:rPr>
+              <a:t>sh</a:t>
+            </a:r>
+            <a:r>
+              <a:rPr kumimoji="0" lang="fa-IR" altLang="en-US" sz="2000" i="0" u="none" strike="noStrike" cap="none" normalizeH="0" baseline="0" dirty="0">
+                <a:ln>
+                  <a:noFill/>
+                </a:ln>
+                <a:solidFill>
+                  <a:schemeClr val="tx1"/>
+                </a:solidFill>
+                <a:effectLst/>
+                <a:latin typeface="Dana Light" pitchFamily="2" charset="-78"/>
+                <a:cs typeface="Dana Light" pitchFamily="2" charset="-78"/>
+              </a:rPr>
+              <a:t>)</a:t>
+            </a:r>
+            <a:r>
+              <a:rPr kumimoji="0" lang="en-US" altLang="en-US" sz="2000" i="0" u="none" strike="noStrike" cap="none" normalizeH="0" baseline="0" dirty="0">
+                <a:ln>
+                  <a:noFill/>
+                </a:ln>
+                <a:solidFill>
+                  <a:schemeClr val="tx1"/>
+                </a:solidFill>
+                <a:effectLst/>
+                <a:latin typeface="Dana Light" pitchFamily="2" charset="-78"/>
+                <a:cs typeface="Dana Light" pitchFamily="2" charset="-78"/>
+              </a:rPr>
+              <a:t> </a:t>
+            </a:r>
+            <a:r>
+              <a:rPr kumimoji="0" lang="ar-SA" altLang="en-US" sz="2000" i="0" u="none" strike="noStrike" cap="none" normalizeH="0" baseline="0" dirty="0">
+                <a:ln>
+                  <a:noFill/>
+                </a:ln>
+                <a:solidFill>
+                  <a:schemeClr val="tx1"/>
+                </a:solidFill>
+                <a:effectLst/>
+                <a:latin typeface="Dana Light" pitchFamily="2" charset="-78"/>
+                <a:cs typeface="Dana Light" pitchFamily="2" charset="-78"/>
+              </a:rPr>
+              <a:t>را کپی کند</a:t>
+            </a:r>
+            <a:br>
+              <a:rPr kumimoji="0" lang="ar-SA" altLang="en-US" sz="2000" i="0" u="none" strike="noStrike" cap="none" normalizeH="0" baseline="0" dirty="0">
+                <a:ln>
+                  <a:noFill/>
+                </a:ln>
+                <a:solidFill>
+                  <a:schemeClr val="tx1"/>
+                </a:solidFill>
+                <a:effectLst/>
+                <a:latin typeface="Dana Light" pitchFamily="2" charset="-78"/>
+                <a:cs typeface="Dana Light" pitchFamily="2" charset="-78"/>
+              </a:rPr>
+            </a:br>
+            <a:r>
+              <a:rPr kumimoji="0" lang="fa-IR" altLang="en-US" sz="2000" i="0" u="none" strike="noStrike" cap="none" normalizeH="0" baseline="0" dirty="0">
+                <a:ln>
+                  <a:noFill/>
+                </a:ln>
+                <a:solidFill>
+                  <a:schemeClr val="tx1"/>
+                </a:solidFill>
+                <a:effectLst/>
+                <a:latin typeface="Dana Light" pitchFamily="2" charset="-78"/>
+                <a:cs typeface="Dana Light" pitchFamily="2" charset="-78"/>
+              </a:rPr>
+              <a:t>- </a:t>
+            </a:r>
+            <a:r>
+              <a:rPr kumimoji="0" lang="ar-SA" altLang="en-US" sz="2000" i="0" u="none" strike="noStrike" cap="none" normalizeH="0" baseline="0" dirty="0">
+                <a:ln>
+                  <a:noFill/>
+                </a:ln>
+                <a:solidFill>
+                  <a:schemeClr val="tx1"/>
+                </a:solidFill>
+                <a:effectLst/>
+                <a:latin typeface="Dana Light" pitchFamily="2" charset="-78"/>
+                <a:cs typeface="Dana Light" pitchFamily="2" charset="-78"/>
+              </a:rPr>
+              <a:t>فایل‌سیستم‌های مجازی مثل </a:t>
+            </a:r>
+            <a:r>
+              <a:rPr kumimoji="0" lang="en-US" altLang="en-US" sz="2000" i="0" u="none" strike="noStrike" cap="none" normalizeH="0" baseline="0" dirty="0">
+                <a:ln>
+                  <a:noFill/>
+                </a:ln>
+                <a:solidFill>
+                  <a:schemeClr val="tx1"/>
+                </a:solidFill>
+                <a:effectLst/>
+                <a:latin typeface="Dana Light" pitchFamily="2" charset="-78"/>
+                <a:cs typeface="Dana Light" pitchFamily="2" charset="-78"/>
+              </a:rPr>
+              <a:t>proc </a:t>
+            </a:r>
+            <a:r>
+              <a:rPr kumimoji="0" lang="ar-SA" altLang="en-US" sz="2000" i="0" u="none" strike="noStrike" cap="none" normalizeH="0" baseline="0" dirty="0">
+                <a:ln>
+                  <a:noFill/>
+                </a:ln>
+                <a:solidFill>
+                  <a:schemeClr val="tx1"/>
+                </a:solidFill>
+                <a:effectLst/>
+                <a:latin typeface="Dana Light" pitchFamily="2" charset="-78"/>
+                <a:cs typeface="Dana Light" pitchFamily="2" charset="-78"/>
+              </a:rPr>
+              <a:t>و </a:t>
+            </a:r>
+            <a:r>
+              <a:rPr kumimoji="0" lang="en-US" altLang="en-US" sz="2000" i="0" u="none" strike="noStrike" cap="none" normalizeH="0" baseline="0" dirty="0">
+                <a:ln>
+                  <a:noFill/>
+                </a:ln>
+                <a:solidFill>
+                  <a:schemeClr val="tx1"/>
+                </a:solidFill>
+                <a:effectLst/>
+                <a:latin typeface="Dana Light" pitchFamily="2" charset="-78"/>
+                <a:cs typeface="Dana Light" pitchFamily="2" charset="-78"/>
+              </a:rPr>
+              <a:t>sys </a:t>
+            </a:r>
+            <a:r>
+              <a:rPr kumimoji="0" lang="ar-SA" altLang="en-US" sz="2000" i="0" u="none" strike="noStrike" cap="none" normalizeH="0" baseline="0" dirty="0">
+                <a:ln>
+                  <a:noFill/>
+                </a:ln>
+                <a:solidFill>
+                  <a:schemeClr val="tx1"/>
+                </a:solidFill>
+                <a:effectLst/>
+                <a:latin typeface="Dana Light" pitchFamily="2" charset="-78"/>
+                <a:cs typeface="Dana Light" pitchFamily="2" charset="-78"/>
+              </a:rPr>
+              <a:t>را </a:t>
+            </a:r>
+            <a:r>
+              <a:rPr kumimoji="0" lang="en-US" altLang="en-US" sz="2000" i="0" u="none" strike="noStrike" cap="none" normalizeH="0" baseline="0" dirty="0">
+                <a:ln>
+                  <a:noFill/>
+                </a:ln>
+                <a:solidFill>
+                  <a:schemeClr val="tx1"/>
+                </a:solidFill>
+                <a:effectLst/>
+                <a:latin typeface="Dana Light" pitchFamily="2" charset="-78"/>
+                <a:cs typeface="Dana Light" pitchFamily="2" charset="-78"/>
+              </a:rPr>
+              <a:t>mount </a:t>
+            </a:r>
+            <a:r>
+              <a:rPr kumimoji="0" lang="ar-SA" altLang="en-US" sz="2000" i="0" u="none" strike="noStrike" cap="none" normalizeH="0" baseline="0" dirty="0">
+                <a:ln>
+                  <a:noFill/>
+                </a:ln>
+                <a:solidFill>
+                  <a:schemeClr val="tx1"/>
+                </a:solidFill>
+                <a:effectLst/>
+                <a:latin typeface="Dana Light" pitchFamily="2" charset="-78"/>
+                <a:cs typeface="Dana Light" pitchFamily="2" charset="-78"/>
+              </a:rPr>
+              <a:t>کند</a:t>
+            </a:r>
+            <a:br>
+              <a:rPr kumimoji="0" lang="ar-SA" altLang="en-US" sz="2000" i="0" u="none" strike="noStrike" cap="none" normalizeH="0" baseline="0" dirty="0">
+                <a:ln>
+                  <a:noFill/>
+                </a:ln>
+                <a:solidFill>
+                  <a:schemeClr val="tx1"/>
+                </a:solidFill>
+                <a:effectLst/>
+                <a:latin typeface="Dana Light" pitchFamily="2" charset="-78"/>
+                <a:cs typeface="Dana Light" pitchFamily="2" charset="-78"/>
+              </a:rPr>
+            </a:br>
+            <a:r>
+              <a:rPr kumimoji="0" lang="fa-IR" altLang="en-US" sz="2000" i="0" u="none" strike="noStrike" cap="none" normalizeH="0" baseline="0" dirty="0">
+                <a:ln>
+                  <a:noFill/>
+                </a:ln>
+                <a:solidFill>
+                  <a:schemeClr val="tx1"/>
+                </a:solidFill>
+                <a:effectLst/>
+                <a:latin typeface="Dana Light" pitchFamily="2" charset="-78"/>
+                <a:cs typeface="Dana Light" pitchFamily="2" charset="-78"/>
+              </a:rPr>
+              <a:t>- </a:t>
+            </a:r>
+            <a:r>
+              <a:rPr kumimoji="0" lang="ar-SA" altLang="en-US" sz="2000" i="0" u="none" strike="noStrike" cap="none" normalizeH="0" baseline="0" dirty="0">
+                <a:ln>
+                  <a:noFill/>
+                </a:ln>
+                <a:solidFill>
+                  <a:schemeClr val="tx1"/>
+                </a:solidFill>
+                <a:effectLst/>
+                <a:latin typeface="Dana Light" pitchFamily="2" charset="-78"/>
+                <a:cs typeface="Dana Light" pitchFamily="2" charset="-78"/>
+              </a:rPr>
+              <a:t>پردازه را داخل آن محیط </a:t>
+            </a:r>
+            <a:r>
+              <a:rPr kumimoji="0" lang="en-US" altLang="en-US" sz="2000" i="0" u="none" strike="noStrike" cap="none" normalizeH="0" baseline="0" dirty="0">
+                <a:ln>
+                  <a:noFill/>
+                </a:ln>
+                <a:solidFill>
+                  <a:schemeClr val="tx1"/>
+                </a:solidFill>
+                <a:effectLst/>
+                <a:latin typeface="Dana Light" pitchFamily="2" charset="-78"/>
+                <a:cs typeface="Dana Light" pitchFamily="2" charset="-78"/>
+              </a:rPr>
+              <a:t>chroot </a:t>
+            </a:r>
+            <a:r>
+              <a:rPr kumimoji="0" lang="ar-SA" altLang="en-US" sz="2000" i="0" u="none" strike="noStrike" cap="none" normalizeH="0" baseline="0" dirty="0">
+                <a:ln>
+                  <a:noFill/>
+                </a:ln>
+                <a:solidFill>
+                  <a:schemeClr val="tx1"/>
+                </a:solidFill>
+                <a:effectLst/>
+                <a:latin typeface="Dana Light" pitchFamily="2" charset="-78"/>
+                <a:cs typeface="Dana Light" pitchFamily="2" charset="-78"/>
+              </a:rPr>
+              <a:t>کند</a:t>
+            </a:r>
+            <a:br>
+              <a:rPr kumimoji="0" lang="ar-SA" altLang="en-US" sz="2000" i="0" u="none" strike="noStrike" cap="none" normalizeH="0" baseline="0" dirty="0">
+                <a:ln>
+                  <a:noFill/>
+                </a:ln>
+                <a:solidFill>
+                  <a:schemeClr val="tx1"/>
+                </a:solidFill>
+                <a:effectLst/>
+                <a:latin typeface="Dana Light" pitchFamily="2" charset="-78"/>
+                <a:cs typeface="Dana Light" pitchFamily="2" charset="-78"/>
+              </a:rPr>
+            </a:br>
+            <a:r>
+              <a:rPr kumimoji="0" lang="ar-SA" altLang="en-US" sz="2000" i="0" u="none" strike="noStrike" cap="none" normalizeH="0" baseline="0" dirty="0">
+                <a:ln>
+                  <a:noFill/>
+                </a:ln>
+                <a:solidFill>
+                  <a:schemeClr val="tx1"/>
+                </a:solidFill>
+                <a:effectLst/>
+                <a:latin typeface="Dana Light" pitchFamily="2" charset="-78"/>
+                <a:cs typeface="Dana Light" pitchFamily="2" charset="-78"/>
+              </a:rPr>
+              <a:t>بعد از پایان کار، </a:t>
+            </a:r>
+            <a:r>
+              <a:rPr kumimoji="0" lang="en-US" altLang="en-US" sz="2000" i="0" u="none" strike="noStrike" cap="none" normalizeH="0" baseline="0" dirty="0">
+                <a:ln>
+                  <a:noFill/>
+                </a:ln>
+                <a:solidFill>
+                  <a:schemeClr val="tx1"/>
+                </a:solidFill>
+                <a:effectLst/>
+                <a:latin typeface="Dana Light" pitchFamily="2" charset="-78"/>
+                <a:cs typeface="Dana Light" pitchFamily="2" charset="-78"/>
+              </a:rPr>
+              <a:t>mount</a:t>
+            </a:r>
+            <a:r>
+              <a:rPr kumimoji="0" lang="ar-SA" altLang="en-US" sz="2000" i="0" u="none" strike="noStrike" cap="none" normalizeH="0" baseline="0" dirty="0">
+                <a:ln>
+                  <a:noFill/>
+                </a:ln>
+                <a:solidFill>
+                  <a:schemeClr val="tx1"/>
+                </a:solidFill>
+                <a:effectLst/>
+                <a:latin typeface="Dana Light" pitchFamily="2" charset="-78"/>
+                <a:cs typeface="Dana Light" pitchFamily="2" charset="-78"/>
+              </a:rPr>
+              <a:t>ها را </a:t>
+            </a:r>
+            <a:r>
+              <a:rPr kumimoji="0" lang="en-US" altLang="en-US" sz="2000" i="0" u="none" strike="noStrike" cap="none" normalizeH="0" baseline="0" dirty="0">
+                <a:ln>
+                  <a:noFill/>
+                </a:ln>
+                <a:solidFill>
+                  <a:schemeClr val="tx1"/>
+                </a:solidFill>
+                <a:effectLst/>
+                <a:latin typeface="Dana Light" pitchFamily="2" charset="-78"/>
+                <a:cs typeface="Dana Light" pitchFamily="2" charset="-78"/>
+              </a:rPr>
+              <a:t>unmount </a:t>
+            </a:r>
+            <a:r>
+              <a:rPr kumimoji="0" lang="ar-SA" altLang="en-US" sz="2000" i="0" u="none" strike="noStrike" cap="none" normalizeH="0" baseline="0" dirty="0">
+                <a:ln>
+                  <a:noFill/>
+                </a:ln>
+                <a:solidFill>
+                  <a:schemeClr val="tx1"/>
+                </a:solidFill>
+                <a:effectLst/>
+                <a:latin typeface="Dana Light" pitchFamily="2" charset="-78"/>
+                <a:cs typeface="Dana Light" pitchFamily="2" charset="-78"/>
+              </a:rPr>
+              <a:t>و محیط را تمیز کند</a:t>
+            </a:r>
+            <a:br>
+              <a:rPr kumimoji="0" lang="en-US" altLang="en-US" sz="2000" i="0" u="none" strike="noStrike" cap="none" normalizeH="0" baseline="0" dirty="0">
+                <a:ln>
+                  <a:noFill/>
+                </a:ln>
+                <a:solidFill>
+                  <a:schemeClr val="tx1"/>
+                </a:solidFill>
+                <a:effectLst/>
+                <a:latin typeface="Dana Light" pitchFamily="2" charset="-78"/>
+                <a:cs typeface="Dana Light" pitchFamily="2" charset="-78"/>
+              </a:rPr>
+            </a:br>
+            <a:br>
+              <a:rPr kumimoji="0" lang="en-US" altLang="en-US" sz="2000" i="0" u="none" strike="noStrike" cap="none" normalizeH="0" baseline="0" dirty="0">
+                <a:ln>
+                  <a:noFill/>
+                </a:ln>
+                <a:solidFill>
+                  <a:schemeClr val="tx1"/>
+                </a:solidFill>
+                <a:effectLst/>
+                <a:latin typeface="Dana Light" pitchFamily="2" charset="-78"/>
+                <a:cs typeface="Dana Light" pitchFamily="2" charset="-78"/>
+              </a:rPr>
+            </a:br>
+            <a:br>
+              <a:rPr kumimoji="0" lang="en-US" altLang="en-US" sz="2000" i="0" u="none" strike="noStrike" cap="none" normalizeH="0" baseline="0" dirty="0">
+                <a:ln>
+                  <a:noFill/>
+                </a:ln>
+                <a:solidFill>
+                  <a:schemeClr val="tx1"/>
+                </a:solidFill>
+                <a:effectLst/>
+                <a:latin typeface="Dana Light" pitchFamily="2" charset="-78"/>
+                <a:cs typeface="Dana Light" pitchFamily="2" charset="-78"/>
+              </a:rPr>
+            </a:br>
+            <a:br>
+              <a:rPr kumimoji="0" lang="en-US" altLang="en-US" sz="2000" i="0" u="none" strike="noStrike" cap="none" normalizeH="0" baseline="0" dirty="0">
+                <a:ln>
+                  <a:noFill/>
+                </a:ln>
+                <a:solidFill>
+                  <a:schemeClr val="tx1"/>
+                </a:solidFill>
+                <a:effectLst/>
+                <a:latin typeface="Dana Light" pitchFamily="2" charset="-78"/>
+                <a:cs typeface="Dana Light" pitchFamily="2" charset="-78"/>
+              </a:rPr>
+            </a:br>
+            <a:br>
+              <a:rPr kumimoji="0" lang="en-US" altLang="en-US" sz="2000" i="0" u="none" strike="noStrike" cap="none" normalizeH="0" baseline="0" dirty="0">
+                <a:ln>
+                  <a:noFill/>
+                </a:ln>
+                <a:solidFill>
+                  <a:schemeClr val="tx1"/>
+                </a:solidFill>
+                <a:effectLst/>
+                <a:latin typeface="Dana Light" pitchFamily="2" charset="-78"/>
+                <a:cs typeface="Dana Light" pitchFamily="2" charset="-78"/>
+              </a:rPr>
+            </a:br>
+            <a:br>
+              <a:rPr kumimoji="0" lang="en-US" altLang="en-US" sz="2000" i="0" u="none" strike="noStrike" cap="none" normalizeH="0" baseline="0" dirty="0">
+                <a:ln>
+                  <a:noFill/>
+                </a:ln>
+                <a:solidFill>
+                  <a:schemeClr val="tx1"/>
+                </a:solidFill>
+                <a:effectLst/>
+                <a:latin typeface="Dana Light" pitchFamily="2" charset="-78"/>
+                <a:cs typeface="Dana Light" pitchFamily="2" charset="-78"/>
+              </a:rPr>
+            </a:br>
+            <a:br>
+              <a:rPr kumimoji="0" lang="en-US" altLang="en-US" sz="2000" i="0" u="none" strike="noStrike" cap="none" normalizeH="0" baseline="0" dirty="0">
+                <a:ln>
+                  <a:noFill/>
+                </a:ln>
+                <a:solidFill>
+                  <a:schemeClr val="tx1"/>
+                </a:solidFill>
+                <a:effectLst/>
+                <a:latin typeface="Dana Light" pitchFamily="2" charset="-78"/>
+                <a:cs typeface="Dana Light" pitchFamily="2" charset="-78"/>
+              </a:rPr>
+            </a:br>
+            <a:r>
+              <a:rPr lang="ar-SA" sz="2000" dirty="0">
+                <a:latin typeface="Dana Light" pitchFamily="2" charset="-78"/>
+                <a:cs typeface="Dana Light" pitchFamily="2" charset="-78"/>
+              </a:rPr>
+              <a:t>«این ماژول وظیفه‌ی ساخت و مدیریت یک </a:t>
+            </a:r>
+            <a:r>
+              <a:rPr lang="en-US" sz="2000" dirty="0">
+                <a:latin typeface="Dana Light" pitchFamily="2" charset="-78"/>
+                <a:cs typeface="Dana Light" pitchFamily="2" charset="-78"/>
+              </a:rPr>
+              <a:t>root filesystem </a:t>
+            </a:r>
+            <a:r>
+              <a:rPr lang="ar-SA" sz="2000" dirty="0">
+                <a:latin typeface="Dana Light" pitchFamily="2" charset="-78"/>
+                <a:cs typeface="Dana Light" pitchFamily="2" charset="-78"/>
+              </a:rPr>
+              <a:t>مینیمال برای کانتینر را دارد. با استفاده از </a:t>
+            </a:r>
+            <a:r>
+              <a:rPr lang="en-US" sz="2000" dirty="0">
+                <a:latin typeface="Dana Light" pitchFamily="2" charset="-78"/>
+                <a:cs typeface="Dana Light" pitchFamily="2" charset="-78"/>
+              </a:rPr>
+              <a:t>chroot </a:t>
+            </a:r>
+            <a:r>
+              <a:rPr lang="ar-SA" sz="2000" dirty="0">
+                <a:latin typeface="Dana Light" pitchFamily="2" charset="-78"/>
+                <a:cs typeface="Dana Light" pitchFamily="2" charset="-78"/>
+              </a:rPr>
+              <a:t>و </a:t>
+            </a:r>
+            <a:r>
+              <a:rPr lang="en-US" sz="2000" dirty="0">
+                <a:latin typeface="Dana Light" pitchFamily="2" charset="-78"/>
+                <a:cs typeface="Dana Light" pitchFamily="2" charset="-78"/>
+              </a:rPr>
+              <a:t>mount، </a:t>
+            </a:r>
+            <a:r>
+              <a:rPr lang="ar-SA" sz="2000" dirty="0">
+                <a:latin typeface="Dana Light" pitchFamily="2" charset="-78"/>
+                <a:cs typeface="Dana Light" pitchFamily="2" charset="-78"/>
+              </a:rPr>
+              <a:t>یک محیط ایزوله‌ی فایل‌سیستمی ایجاد می‌کند که برنامه داخل آن اجرا می‌شود. این بخش معادل </a:t>
+            </a:r>
+            <a:r>
+              <a:rPr lang="en-US" sz="2000" dirty="0">
+                <a:latin typeface="Dana Light" pitchFamily="2" charset="-78"/>
+                <a:cs typeface="Dana Light" pitchFamily="2" charset="-78"/>
+              </a:rPr>
+              <a:t>filesystem layer </a:t>
+            </a:r>
+            <a:r>
+              <a:rPr lang="ar-SA" sz="2000" dirty="0">
+                <a:latin typeface="Dana Light" pitchFamily="2" charset="-78"/>
+                <a:cs typeface="Dana Light" pitchFamily="2" charset="-78"/>
+              </a:rPr>
+              <a:t>در </a:t>
+            </a:r>
+            <a:r>
+              <a:rPr lang="en-US" sz="2000" dirty="0">
+                <a:latin typeface="Dana Light" pitchFamily="2" charset="-78"/>
+                <a:cs typeface="Dana Light" pitchFamily="2" charset="-78"/>
+              </a:rPr>
+              <a:t>Docker </a:t>
+            </a:r>
+            <a:r>
+              <a:rPr lang="ar-SA" sz="2000" dirty="0">
+                <a:latin typeface="Dana Light" pitchFamily="2" charset="-78"/>
+                <a:cs typeface="Dana Light" pitchFamily="2" charset="-78"/>
+              </a:rPr>
+              <a:t>است.»</a:t>
+            </a:r>
+            <a:br>
+              <a:rPr lang="en-US" sz="2000" dirty="0">
+                <a:latin typeface="Dana Light" pitchFamily="2" charset="-78"/>
+                <a:cs typeface="Dana Light" pitchFamily="2" charset="-78"/>
+              </a:rPr>
+            </a:br>
+            <a:endParaRPr lang="en-US" sz="2000" dirty="0"/>
+          </a:p>
+        </p:txBody>
+      </p:sp>
+    </p:spTree>
+    <p:extLst>
+      <p:ext uri="{BB962C8B-B14F-4D97-AF65-F5344CB8AC3E}">
+        <p14:creationId xmlns:p14="http://schemas.microsoft.com/office/powerpoint/2010/main" val="3618116237"/>
+      </p:ext>
+    </p:extLst>
+  </p:cSld>
+  <p:clrMapOvr>
+    <a:masterClrMapping/>
+  </p:clrMapOvr>
+</p:sld>
+</file>
+
+<file path=ppt/slides/slide6.xml><?xml version="1.0" encoding="utf-8"?>
+<p:sld xmlns:a="http://schemas.openxmlformats.org/drawingml/2006/main" xmlns:r="http://schemas.openxmlformats.org/officeDocument/2006/relationships" xmlns:p="http://schemas.openxmlformats.org/presentationml/2006/main">
+  <p:cSld>
+    <p:spTree>
+      <p:nvGrpSpPr>
+        <p:cNvPr id="1" name=""/>
+        <p:cNvGrpSpPr/>
+        <p:nvPr/>
+      </p:nvGrpSpPr>
+      <p:grpSpPr>
+        <a:xfrm>
+          <a:off x="0" y="0"/>
+          <a:ext cx="0" cy="0"/>
+          <a:chOff x="0" y="0"/>
+          <a:chExt cx="0" cy="0"/>
+        </a:xfrm>
+      </p:grpSpPr>
+      <p:pic>
+        <p:nvPicPr>
+          <p:cNvPr id="6" name="Picture 5" descr="A diagram of a software system">
+            <a:extLst>
+              <a:ext uri="{FF2B5EF4-FFF2-40B4-BE49-F238E27FC236}">
+                <a16:creationId xmlns:a16="http://schemas.microsoft.com/office/drawing/2014/main" id="{03B69179-EC5B-09BD-36AD-5E72FF430A46}"/>
+              </a:ext>
+            </a:extLst>
+          </p:cNvPr>
+          <p:cNvPicPr>
+            <a:picLocks noChangeAspect="1"/>
+          </p:cNvPicPr>
+          <p:nvPr/>
+        </p:nvPicPr>
+        <p:blipFill>
+          <a:blip r:embed="rId2"/>
+          <a:stretch>
+            <a:fillRect/>
+          </a:stretch>
+        </p:blipFill>
+        <p:spPr>
+          <a:xfrm>
+            <a:off x="2548467" y="0"/>
+            <a:ext cx="3818467" cy="6841420"/>
+          </a:xfrm>
+          <a:prstGeom prst="rect">
+            <a:avLst/>
+          </a:prstGeom>
+        </p:spPr>
+      </p:pic>
+      <p:sp>
+        <p:nvSpPr>
+          <p:cNvPr id="4" name="Rectangle 1">
+            <a:extLst>
+              <a:ext uri="{FF2B5EF4-FFF2-40B4-BE49-F238E27FC236}">
+                <a16:creationId xmlns:a16="http://schemas.microsoft.com/office/drawing/2014/main" id="{1478AB2E-6E65-DB78-666F-54E456397E2F}"/>
+              </a:ext>
+            </a:extLst>
+          </p:cNvPr>
+          <p:cNvSpPr>
+            <a:spLocks noGrp="1" noChangeArrowheads="1"/>
+          </p:cNvSpPr>
+          <p:nvPr>
+            <p:ph idx="1"/>
+          </p:nvPr>
+        </p:nvSpPr>
+        <p:spPr bwMode="auto">
+          <a:xfrm>
+            <a:off x="4207933" y="1568450"/>
+            <a:ext cx="4766733" cy="707886"/>
+          </a:xfrm>
+          <a:prstGeom prst="rect">
+            <a:avLst/>
+          </a:prstGeom>
+          <a:noFill/>
+          <a:ln>
+            <a:noFill/>
+          </a:ln>
+          <a:effectLst/>
+          <a:extLst>
+            <a:ext uri="{909E8E84-426E-40DD-AFC4-6F175D3DCCD1}">
+              <a14:hiddenFill xmlns:a14="http://schemas.microsoft.com/office/drawing/2010/main">
+                <a:solidFill>
+                  <a:schemeClr val="accent1"/>
+                </a:solidFill>
+              </a14:hiddenFill>
+            </a:ext>
+            <a:ext uri="{91240B29-F687-4F45-9708-019B960494DF}">
+              <a14:hiddenLine xmlns:a14="http://schemas.microsoft.com/office/drawing/2010/main" w="9525">
+                <a:solidFill>
+                  <a:schemeClr val="tx1"/>
+                </a:solidFill>
+                <a:miter lim="800000"/>
+                <a:headEnd/>
+                <a:tailEnd/>
+              </a14:hiddenLine>
+            </a:ext>
+            <a:ext uri="{AF507438-7753-43E0-B8FC-AC1667EBCBE1}">
+              <a14:hiddenEffects xmlns:a14="http://schemas.microsoft.com/office/drawing/2010/main">
+                <a:effectLst>
+                  <a:outerShdw dist="35921" dir="2700000" algn="ctr" rotWithShape="0">
+                    <a:schemeClr val="bg2"/>
+                  </a:outerShdw>
+                </a:effectLst>
+              </a14:hiddenEffects>
+            </a:ext>
+          </a:extLst>
+        </p:spPr>
+        <p:txBody>
+          <a:bodyPr vert="horz" wrap="square" lIns="91440" tIns="45720" rIns="91440" bIns="45720" numCol="1" anchor="ctr" anchorCtr="0" compatLnSpc="1">
+            <a:prstTxWarp prst="textNoShape">
+              <a:avLst/>
+            </a:prstTxWarp>
+            <a:spAutoFit/>
+          </a:bodyPr>
+          <a:lstStyle/>
+          <a:p>
+            <a:pPr marR="0" lvl="0" algn="r" defTabSz="914400" rtl="1" eaLnBrk="0" fontAlgn="base" latinLnBrk="0" hangingPunct="0">
+              <a:lnSpc>
+                <a:spcPct val="100000"/>
+              </a:lnSpc>
+              <a:spcBef>
+                <a:spcPct val="0"/>
+              </a:spcBef>
+              <a:spcAft>
+                <a:spcPct val="0"/>
+              </a:spcAft>
+              <a:buClrTx/>
+              <a:buSzTx/>
+              <a:buFontTx/>
+              <a:buChar char="-"/>
+              <a:tabLst/>
+            </a:pPr>
+            <a:endParaRPr lang="en-US" altLang="en-US" sz="2000" dirty="0">
+              <a:latin typeface="Dana Light" pitchFamily="2" charset="-78"/>
+              <a:cs typeface="Dana Light" pitchFamily="2" charset="-78"/>
+            </a:endParaRPr>
+          </a:p>
+          <a:p>
+            <a:pPr marR="0" lvl="0" algn="r" defTabSz="914400" rtl="1" eaLnBrk="0" fontAlgn="base" latinLnBrk="0" hangingPunct="0">
+              <a:lnSpc>
+                <a:spcPct val="100000"/>
+              </a:lnSpc>
+              <a:spcBef>
+                <a:spcPct val="0"/>
+              </a:spcBef>
+              <a:spcAft>
+                <a:spcPct val="0"/>
+              </a:spcAft>
+              <a:buClrTx/>
+              <a:buSzTx/>
+              <a:buFontTx/>
+              <a:buChar char="-"/>
+              <a:tabLst/>
+            </a:pPr>
+            <a:endParaRPr kumimoji="0" lang="en-US" altLang="en-US" sz="2000" i="0" u="none" strike="noStrike" cap="none" normalizeH="0" baseline="0" dirty="0">
+              <a:ln>
+                <a:noFill/>
+              </a:ln>
+              <a:solidFill>
+                <a:schemeClr val="tx1"/>
+              </a:solidFill>
+              <a:effectLst/>
+              <a:latin typeface="Dana Light" pitchFamily="2" charset="-78"/>
+              <a:cs typeface="Dana Light" pitchFamily="2" charset="-78"/>
+            </a:endParaRPr>
+          </a:p>
+        </p:txBody>
+      </p:sp>
+    </p:spTree>
+    <p:extLst>
+      <p:ext uri="{BB962C8B-B14F-4D97-AF65-F5344CB8AC3E}">
+        <p14:creationId xmlns:p14="http://schemas.microsoft.com/office/powerpoint/2010/main" val="3848195897"/>
+      </p:ext>
+    </p:extLst>
+  </p:cSld>
+  <p:clrMapOvr>
+    <a:masterClrMapping/>
+  </p:clrMapOvr>
+</p:sld>
+</file>
+
+<file path=ppt/slides/slide7.xml><?xml version="1.0" encoding="utf-8"?>
 <p:sld xmlns:a="http://schemas.openxmlformats.org/drawingml/2006/main" xmlns:r="http://schemas.openxmlformats.org/officeDocument/2006/relationships" xmlns:p="http://schemas.openxmlformats.org/presentationml/2006/main">
   <p:cSld>
     <p:spTree>

</xml_diff>